<commit_message>
make the game slide interactive
</commit_message>
<xml_diff>
--- a/Decision Trees.pptx
+++ b/Decision Trees.pptx
@@ -962,7 +962,7 @@
   <p:cSld>
     <p:spTree>
       <p:nvGrpSpPr>
-        <p:cNvPr id="206" name="Shape 206"/>
+        <p:cNvPr id="207" name="Shape 207"/>
         <p:cNvGrpSpPr/>
         <p:nvPr/>
       </p:nvGrpSpPr>
@@ -976,7 +976,7 @@
       </p:grpSpPr>
       <p:sp>
         <p:nvSpPr>
-          <p:cNvPr id="207" name="Google Shape;207;g30cdd4302a2_2_148:notes"/>
+          <p:cNvPr id="208" name="Google Shape;208;g30cdd4302a2_2_148:notes"/>
           <p:cNvSpPr/>
           <p:nvPr>
             <p:ph idx="2" type="sldImg"/>
@@ -1021,7 +1021,7 @@
       </p:sp>
       <p:sp>
         <p:nvSpPr>
-          <p:cNvPr id="208" name="Google Shape;208;g30cdd4302a2_2_148:notes"/>
+          <p:cNvPr id="209" name="Google Shape;209;g30cdd4302a2_2_148:notes"/>
           <p:cNvSpPr txBox="1"/>
           <p:nvPr>
             <p:ph idx="1" type="body"/>
@@ -1079,7 +1079,7 @@
   <p:cSld>
     <p:spTree>
       <p:nvGrpSpPr>
-        <p:cNvPr id="218" name="Shape 218"/>
+        <p:cNvPr id="219" name="Shape 219"/>
         <p:cNvGrpSpPr/>
         <p:nvPr/>
       </p:nvGrpSpPr>
@@ -1093,7 +1093,7 @@
       </p:grpSpPr>
       <p:sp>
         <p:nvSpPr>
-          <p:cNvPr id="219" name="Google Shape;219;g30cdd4302a2_2_159:notes"/>
+          <p:cNvPr id="220" name="Google Shape;220;g30cdd4302a2_2_159:notes"/>
           <p:cNvSpPr/>
           <p:nvPr>
             <p:ph idx="2" type="sldImg"/>
@@ -1138,7 +1138,7 @@
       </p:sp>
       <p:sp>
         <p:nvSpPr>
-          <p:cNvPr id="220" name="Google Shape;220;g30cdd4302a2_2_159:notes"/>
+          <p:cNvPr id="221" name="Google Shape;221;g30cdd4302a2_2_159:notes"/>
           <p:cNvSpPr txBox="1"/>
           <p:nvPr>
             <p:ph idx="1" type="body"/>
@@ -1196,7 +1196,7 @@
   <p:cSld>
     <p:spTree>
       <p:nvGrpSpPr>
-        <p:cNvPr id="227" name="Shape 227"/>
+        <p:cNvPr id="228" name="Shape 228"/>
         <p:cNvGrpSpPr/>
         <p:nvPr/>
       </p:nvGrpSpPr>
@@ -1210,7 +1210,7 @@
       </p:grpSpPr>
       <p:sp>
         <p:nvSpPr>
-          <p:cNvPr id="228" name="Google Shape;228;g30cdd4302a2_2_167:notes"/>
+          <p:cNvPr id="229" name="Google Shape;229;g30cdd4302a2_2_167:notes"/>
           <p:cNvSpPr/>
           <p:nvPr>
             <p:ph idx="2" type="sldImg"/>
@@ -1255,7 +1255,7 @@
       </p:sp>
       <p:sp>
         <p:nvSpPr>
-          <p:cNvPr id="229" name="Google Shape;229;g30cdd4302a2_2_167:notes"/>
+          <p:cNvPr id="230" name="Google Shape;230;g30cdd4302a2_2_167:notes"/>
           <p:cNvSpPr txBox="1"/>
           <p:nvPr>
             <p:ph idx="1" type="body"/>
@@ -1313,7 +1313,7 @@
   <p:cSld>
     <p:spTree>
       <p:nvGrpSpPr>
-        <p:cNvPr id="234" name="Shape 234"/>
+        <p:cNvPr id="235" name="Shape 235"/>
         <p:cNvGrpSpPr/>
         <p:nvPr/>
       </p:nvGrpSpPr>
@@ -1327,7 +1327,7 @@
       </p:grpSpPr>
       <p:sp>
         <p:nvSpPr>
-          <p:cNvPr id="235" name="Google Shape;235;g30cdd4302a2_2_173:notes"/>
+          <p:cNvPr id="236" name="Google Shape;236;g30cdd4302a2_2_173:notes"/>
           <p:cNvSpPr/>
           <p:nvPr>
             <p:ph idx="2" type="sldImg"/>
@@ -1372,7 +1372,7 @@
       </p:sp>
       <p:sp>
         <p:nvSpPr>
-          <p:cNvPr id="236" name="Google Shape;236;g30cdd4302a2_2_173:notes"/>
+          <p:cNvPr id="237" name="Google Shape;237;g30cdd4302a2_2_173:notes"/>
           <p:cNvSpPr txBox="1"/>
           <p:nvPr>
             <p:ph idx="1" type="body"/>
@@ -1430,7 +1430,7 @@
   <p:cSld>
     <p:spTree>
       <p:nvGrpSpPr>
-        <p:cNvPr id="241" name="Shape 241"/>
+        <p:cNvPr id="242" name="Shape 242"/>
         <p:cNvGrpSpPr/>
         <p:nvPr/>
       </p:nvGrpSpPr>
@@ -1444,7 +1444,7 @@
       </p:grpSpPr>
       <p:sp>
         <p:nvSpPr>
-          <p:cNvPr id="242" name="Google Shape;242;g30cdd4302a2_9_19:notes"/>
+          <p:cNvPr id="243" name="Google Shape;243;g30cdd4302a2_9_19:notes"/>
           <p:cNvSpPr/>
           <p:nvPr>
             <p:ph idx="2" type="sldImg"/>
@@ -1479,7 +1479,7 @@
       </p:sp>
       <p:sp>
         <p:nvSpPr>
-          <p:cNvPr id="243" name="Google Shape;243;g30cdd4302a2_9_19:notes"/>
+          <p:cNvPr id="244" name="Google Shape;244;g30cdd4302a2_9_19:notes"/>
           <p:cNvSpPr txBox="1"/>
           <p:nvPr>
             <p:ph idx="1" type="body"/>
@@ -1529,7 +1529,7 @@
   <p:cSld>
     <p:spTree>
       <p:nvGrpSpPr>
-        <p:cNvPr id="255" name="Shape 255"/>
+        <p:cNvPr id="256" name="Shape 256"/>
         <p:cNvGrpSpPr/>
         <p:nvPr/>
       </p:nvGrpSpPr>
@@ -1543,7 +1543,7 @@
       </p:grpSpPr>
       <p:sp>
         <p:nvSpPr>
-          <p:cNvPr id="256" name="Google Shape;256;g30cdd4302a2_9_14:notes"/>
+          <p:cNvPr id="257" name="Google Shape;257;g30cdd4302a2_9_14:notes"/>
           <p:cNvSpPr/>
           <p:nvPr>
             <p:ph idx="2" type="sldImg"/>
@@ -1578,7 +1578,7 @@
       </p:sp>
       <p:sp>
         <p:nvSpPr>
-          <p:cNvPr id="257" name="Google Shape;257;g30cdd4302a2_9_14:notes"/>
+          <p:cNvPr id="258" name="Google Shape;258;g30cdd4302a2_9_14:notes"/>
           <p:cNvSpPr txBox="1"/>
           <p:nvPr>
             <p:ph idx="1" type="body"/>
@@ -1628,7 +1628,7 @@
   <p:cSld>
     <p:spTree>
       <p:nvGrpSpPr>
-        <p:cNvPr id="269" name="Shape 269"/>
+        <p:cNvPr id="270" name="Shape 270"/>
         <p:cNvGrpSpPr/>
         <p:nvPr/>
       </p:nvGrpSpPr>
@@ -1642,7 +1642,7 @@
       </p:grpSpPr>
       <p:sp>
         <p:nvSpPr>
-          <p:cNvPr id="270" name="Google Shape;270;g30cdd4302a2_2_213:notes"/>
+          <p:cNvPr id="271" name="Google Shape;271;g30cdd4302a2_2_213:notes"/>
           <p:cNvSpPr/>
           <p:nvPr>
             <p:ph idx="2" type="sldImg"/>
@@ -1687,7 +1687,7 @@
       </p:sp>
       <p:sp>
         <p:nvSpPr>
-          <p:cNvPr id="271" name="Google Shape;271;g30cdd4302a2_2_213:notes"/>
+          <p:cNvPr id="272" name="Google Shape;272;g30cdd4302a2_2_213:notes"/>
           <p:cNvSpPr txBox="1"/>
           <p:nvPr>
             <p:ph idx="1" type="body"/>
@@ -1745,7 +1745,7 @@
   <p:cSld>
     <p:spTree>
       <p:nvGrpSpPr>
-        <p:cNvPr id="277" name="Shape 277"/>
+        <p:cNvPr id="278" name="Shape 278"/>
         <p:cNvGrpSpPr/>
         <p:nvPr/>
       </p:nvGrpSpPr>
@@ -1759,7 +1759,7 @@
       </p:grpSpPr>
       <p:sp>
         <p:nvSpPr>
-          <p:cNvPr id="278" name="Google Shape;278;g30cdd4302a2_9_9:notes"/>
+          <p:cNvPr id="279" name="Google Shape;279;g30cdd4302a2_9_9:notes"/>
           <p:cNvSpPr/>
           <p:nvPr>
             <p:ph idx="2" type="sldImg"/>
@@ -1794,7 +1794,7 @@
       </p:sp>
       <p:sp>
         <p:nvSpPr>
-          <p:cNvPr id="279" name="Google Shape;279;g30cdd4302a2_9_9:notes"/>
+          <p:cNvPr id="280" name="Google Shape;280;g30cdd4302a2_9_9:notes"/>
           <p:cNvSpPr txBox="1"/>
           <p:nvPr>
             <p:ph idx="1" type="body"/>
@@ -1844,7 +1844,7 @@
   <p:cSld>
     <p:spTree>
       <p:nvGrpSpPr>
-        <p:cNvPr id="283" name="Shape 283"/>
+        <p:cNvPr id="284" name="Shape 284"/>
         <p:cNvGrpSpPr/>
         <p:nvPr/>
       </p:nvGrpSpPr>
@@ -1858,7 +1858,7 @@
       </p:grpSpPr>
       <p:sp>
         <p:nvSpPr>
-          <p:cNvPr id="284" name="Google Shape;284;g30cdd4302a2_2_220:notes"/>
+          <p:cNvPr id="285" name="Google Shape;285;g30cdd4302a2_2_220:notes"/>
           <p:cNvSpPr/>
           <p:nvPr>
             <p:ph idx="2" type="sldImg"/>
@@ -1903,7 +1903,7 @@
       </p:sp>
       <p:sp>
         <p:nvSpPr>
-          <p:cNvPr id="285" name="Google Shape;285;g30cdd4302a2_2_220:notes"/>
+          <p:cNvPr id="286" name="Google Shape;286;g30cdd4302a2_2_220:notes"/>
           <p:cNvSpPr txBox="1"/>
           <p:nvPr>
             <p:ph idx="1" type="body"/>
@@ -2078,7 +2078,7 @@
   <p:cSld>
     <p:spTree>
       <p:nvGrpSpPr>
-        <p:cNvPr id="290" name="Shape 290"/>
+        <p:cNvPr id="291" name="Shape 291"/>
         <p:cNvGrpSpPr/>
         <p:nvPr/>
       </p:nvGrpSpPr>
@@ -2092,7 +2092,7 @@
       </p:grpSpPr>
       <p:sp>
         <p:nvSpPr>
-          <p:cNvPr id="291" name="Google Shape;291;g30cdd4302a2_2_226:notes"/>
+          <p:cNvPr id="292" name="Google Shape;292;g30cdd4302a2_2_226:notes"/>
           <p:cNvSpPr/>
           <p:nvPr>
             <p:ph idx="2" type="sldImg"/>
@@ -2137,7 +2137,7 @@
       </p:sp>
       <p:sp>
         <p:nvSpPr>
-          <p:cNvPr id="292" name="Google Shape;292;g30cdd4302a2_2_226:notes"/>
+          <p:cNvPr id="293" name="Google Shape;293;g30cdd4302a2_2_226:notes"/>
           <p:cNvSpPr txBox="1"/>
           <p:nvPr>
             <p:ph idx="1" type="body"/>
@@ -2195,7 +2195,7 @@
   <p:cSld>
     <p:spTree>
       <p:nvGrpSpPr>
-        <p:cNvPr id="297" name="Shape 297"/>
+        <p:cNvPr id="298" name="Shape 298"/>
         <p:cNvGrpSpPr/>
         <p:nvPr/>
       </p:nvGrpSpPr>
@@ -2209,7 +2209,7 @@
       </p:grpSpPr>
       <p:sp>
         <p:nvSpPr>
-          <p:cNvPr id="298" name="Google Shape;298;g30cdd4302a2_2_232:notes"/>
+          <p:cNvPr id="299" name="Google Shape;299;g30cdd4302a2_2_232:notes"/>
           <p:cNvSpPr/>
           <p:nvPr>
             <p:ph idx="2" type="sldImg"/>
@@ -2254,7 +2254,7 @@
       </p:sp>
       <p:sp>
         <p:nvSpPr>
-          <p:cNvPr id="299" name="Google Shape;299;g30cdd4302a2_2_232:notes"/>
+          <p:cNvPr id="300" name="Google Shape;300;g30cdd4302a2_2_232:notes"/>
           <p:cNvSpPr txBox="1"/>
           <p:nvPr>
             <p:ph idx="1" type="body"/>
@@ -16709,34 +16709,6 @@
                 <a:spcPts val="1200"/>
               </a:spcBef>
               <a:spcAft>
-                <a:spcPts val="0"/>
-              </a:spcAft>
-              <a:buSzPts val="1800"/>
-              <a:buNone/>
-            </a:pPr>
-            <a:r>
-              <a:rPr lang="ar" sz="2000">
-                <a:solidFill>
-                  <a:srgbClr val="2E3436"/>
-                </a:solidFill>
-              </a:rPr>
-              <a:t>Does the animal have more than 2 legs?  </a:t>
-            </a:r>
-            <a:endParaRPr b="1" sz="2000">
-              <a:solidFill>
-                <a:srgbClr val="2E3436"/>
-              </a:solidFill>
-            </a:endParaRPr>
-          </a:p>
-          <a:p>
-            <a:pPr indent="0" lvl="0" marL="2743200" rtl="0" algn="l">
-              <a:lnSpc>
-                <a:spcPct val="115000"/>
-              </a:lnSpc>
-              <a:spcBef>
-                <a:spcPts val="1200"/>
-              </a:spcBef>
-              <a:spcAft>
                 <a:spcPts val="1200"/>
               </a:spcAft>
               <a:buSzPts val="1800"/>
@@ -16957,8 +16929,8 @@
         </p:nvSpPr>
         <p:spPr>
           <a:xfrm>
-            <a:off x="7586421" y="1705428"/>
-            <a:ext cx="914400" cy="400110"/>
+            <a:off x="7575846" y="1745278"/>
+            <a:ext cx="914400" cy="400200"/>
           </a:xfrm>
           <a:prstGeom prst="rect">
             <a:avLst/>
@@ -17010,6 +16982,64 @@
           </a:p>
         </p:txBody>
       </p:sp>
+      <p:sp>
+        <p:nvSpPr>
+          <p:cNvPr id="206" name="Google Shape;206;p34"/>
+          <p:cNvSpPr txBox="1"/>
+          <p:nvPr/>
+        </p:nvSpPr>
+        <p:spPr>
+          <a:xfrm>
+            <a:off x="3077725" y="1691300"/>
+            <a:ext cx="4632600" cy="428400"/>
+          </a:xfrm>
+          <a:prstGeom prst="rect">
+            <a:avLst/>
+          </a:prstGeom>
+          <a:noFill/>
+          <a:ln>
+            <a:noFill/>
+          </a:ln>
+        </p:spPr>
+        <p:txBody>
+          <a:bodyPr anchorCtr="0" anchor="t" bIns="91425" lIns="91425" spcFirstLastPara="1" rIns="91425" wrap="square" tIns="91425">
+            <a:noAutofit/>
+          </a:bodyPr>
+          <a:lstStyle/>
+          <a:p>
+            <a:pPr indent="0" lvl="0" marL="0" rtl="0" algn="l">
+              <a:spcBef>
+                <a:spcPts val="0"/>
+              </a:spcBef>
+              <a:spcAft>
+                <a:spcPts val="0"/>
+              </a:spcAft>
+              <a:buNone/>
+            </a:pPr>
+            <a:r>
+              <a:rPr lang="ar" sz="2000">
+                <a:solidFill>
+                  <a:srgbClr val="2E3436"/>
+                </a:solidFill>
+                <a:latin typeface="Lato"/>
+                <a:ea typeface="Lato"/>
+                <a:cs typeface="Lato"/>
+                <a:sym typeface="Lato"/>
+              </a:rPr>
+              <a:t>Does the animal have more than 2 legs?</a:t>
+            </a:r>
+            <a:endParaRPr sz="2000">
+              <a:solidFill>
+                <a:srgbClr val="2E3436"/>
+              </a:solidFill>
+              <a:latin typeface="Lato"/>
+              <a:ea typeface="Lato"/>
+              <a:cs typeface="Lato"/>
+              <a:sym typeface="Lato"/>
+            </a:endParaRPr>
+          </a:p>
+        </p:txBody>
+      </p:sp>
     </p:spTree>
   </p:cSld>
   <p:clrMapOvr>
@@ -17023,6 +17053,51 @@
             <p:seq concurrent="1" nextAc="seek">
               <p:cTn dur="indefinite" id="2" nodeType="mainSeq">
                 <p:childTnLst>
+                  <p:par>
+                    <p:cTn fill="hold">
+                      <p:stCondLst>
+                        <p:cond delay="indefinite"/>
+                      </p:stCondLst>
+                      <p:childTnLst>
+                        <p:par>
+                          <p:cTn fill="hold">
+                            <p:stCondLst>
+                              <p:cond delay="0"/>
+                            </p:stCondLst>
+                            <p:childTnLst>
+                              <p:par>
+                                <p:cTn fill="hold" nodeType="clickEffect" presetClass="entr" presetID="1" presetSubtype="0">
+                                  <p:stCondLst>
+                                    <p:cond delay="0"/>
+                                  </p:stCondLst>
+                                  <p:childTnLst>
+                                    <p:set>
+                                      <p:cBhvr>
+                                        <p:cTn dur="1" fill="hold">
+                                          <p:stCondLst>
+                                            <p:cond delay="0"/>
+                                          </p:stCondLst>
+                                        </p:cTn>
+                                        <p:tgtEl>
+                                          <p:spTgt spid="206"/>
+                                        </p:tgtEl>
+                                        <p:attrNameLst>
+                                          <p:attrName>style.visibility</p:attrName>
+                                        </p:attrNameLst>
+                                      </p:cBhvr>
+                                      <p:to>
+                                        <p:strVal val="visible"/>
+                                      </p:to>
+                                    </p:set>
+                                  </p:childTnLst>
+                                </p:cTn>
+                              </p:par>
+                            </p:childTnLst>
+                          </p:cTn>
+                        </p:par>
+                      </p:childTnLst>
+                    </p:cTn>
+                  </p:par>
                   <p:par>
                     <p:cTn fill="hold">
                       <p:stCondLst>
@@ -17152,7 +17227,7 @@
   <p:cSld>
     <p:spTree>
       <p:nvGrpSpPr>
-        <p:cNvPr id="209" name="Shape 209"/>
+        <p:cNvPr id="210" name="Shape 210"/>
         <p:cNvGrpSpPr/>
         <p:nvPr/>
       </p:nvGrpSpPr>
@@ -17166,7 +17241,7 @@
       </p:grpSpPr>
       <p:sp>
         <p:nvSpPr>
-          <p:cNvPr id="210" name="Google Shape;210;p35"/>
+          <p:cNvPr id="211" name="Google Shape;211;p35"/>
           <p:cNvSpPr txBox="1"/>
           <p:nvPr>
             <p:ph type="title"/>
@@ -17241,7 +17316,7 @@
       </p:sp>
       <p:sp>
         <p:nvSpPr>
-          <p:cNvPr id="211" name="Google Shape;211;p35"/>
+          <p:cNvPr id="212" name="Google Shape;212;p35"/>
           <p:cNvSpPr txBox="1"/>
           <p:nvPr>
             <p:ph idx="1" type="body"/>
@@ -17335,7 +17410,7 @@
       </p:sp>
       <p:sp>
         <p:nvSpPr>
-          <p:cNvPr id="212" name="Google Shape;212;p35"/>
+          <p:cNvPr id="213" name="Google Shape;213;p35"/>
           <p:cNvSpPr/>
           <p:nvPr/>
         </p:nvSpPr>
@@ -17394,7 +17469,7 @@
       </p:sp>
       <p:sp>
         <p:nvSpPr>
-          <p:cNvPr id="213" name="Google Shape;213;p35"/>
+          <p:cNvPr id="214" name="Google Shape;214;p35"/>
           <p:cNvSpPr txBox="1"/>
           <p:nvPr>
             <p:ph idx="12" type="sldNum"/>
@@ -17442,7 +17517,7 @@
       </p:sp>
       <p:pic>
         <p:nvPicPr>
-          <p:cNvPr descr="A cartoon of a spider&#10;&#10;Description automatically generated" id="214" name="Google Shape;214;p35"/>
+          <p:cNvPr descr="A cartoon of a spider&#10;&#10;Description automatically generated" id="215" name="Google Shape;215;p35"/>
           <p:cNvPicPr preferRelativeResize="0"/>
           <p:nvPr/>
         </p:nvPicPr>
@@ -17469,7 +17544,7 @@
       </p:pic>
       <p:cxnSp>
         <p:nvCxnSpPr>
-          <p:cNvPr id="215" name="Google Shape;215;p35"/>
+          <p:cNvPr id="216" name="Google Shape;216;p35"/>
           <p:cNvCxnSpPr/>
           <p:nvPr/>
         </p:nvCxnSpPr>
@@ -17502,7 +17577,7 @@
       </p:cxnSp>
       <p:cxnSp>
         <p:nvCxnSpPr>
-          <p:cNvPr id="216" name="Google Shape;216;p35"/>
+          <p:cNvPr id="217" name="Google Shape;217;p35"/>
           <p:cNvCxnSpPr/>
           <p:nvPr/>
         </p:nvCxnSpPr>
@@ -17535,7 +17610,7 @@
       </p:cxnSp>
       <p:sp>
         <p:nvSpPr>
-          <p:cNvPr id="217" name="Google Shape;217;p35"/>
+          <p:cNvPr id="218" name="Google Shape;218;p35"/>
           <p:cNvSpPr txBox="1"/>
           <p:nvPr/>
         </p:nvSpPr>
@@ -17633,7 +17708,7 @@
                                           </p:stCondLst>
                                         </p:cTn>
                                         <p:tgtEl>
-                                          <p:spTgt spid="217"/>
+                                          <p:spTgt spid="212"/>
                                         </p:tgtEl>
                                         <p:attrNameLst>
                                           <p:attrName>style.visibility</p:attrName>
@@ -17646,8 +17721,26 @@
                                   </p:childTnLst>
                                 </p:cTn>
                               </p:par>
+                            </p:childTnLst>
+                          </p:cTn>
+                        </p:par>
+                      </p:childTnLst>
+                    </p:cTn>
+                  </p:par>
+                  <p:par>
+                    <p:cTn fill="hold">
+                      <p:stCondLst>
+                        <p:cond delay="indefinite"/>
+                      </p:stCondLst>
+                      <p:childTnLst>
+                        <p:par>
+                          <p:cTn fill="hold">
+                            <p:stCondLst>
+                              <p:cond delay="0"/>
+                            </p:stCondLst>
+                            <p:childTnLst>
                               <p:par>
-                                <p:cTn fill="hold" nodeType="withEffect" presetClass="entr" presetID="1" presetSubtype="0">
+                                <p:cTn fill="hold" nodeType="clickEffect" presetClass="entr" presetID="1" presetSubtype="0">
                                   <p:stCondLst>
                                     <p:cond delay="0"/>
                                   </p:stCondLst>
@@ -17660,7 +17753,7 @@
                                           </p:stCondLst>
                                         </p:cTn>
                                         <p:tgtEl>
-                                          <p:spTgt spid="215"/>
+                                          <p:spTgt spid="218"/>
                                         </p:tgtEl>
                                         <p:attrNameLst>
                                           <p:attrName>style.visibility</p:attrName>
@@ -17688,6 +17781,33 @@
                                         </p:cTn>
                                         <p:tgtEl>
                                           <p:spTgt spid="216"/>
+                                        </p:tgtEl>
+                                        <p:attrNameLst>
+                                          <p:attrName>style.visibility</p:attrName>
+                                        </p:attrNameLst>
+                                      </p:cBhvr>
+                                      <p:to>
+                                        <p:strVal val="visible"/>
+                                      </p:to>
+                                    </p:set>
+                                  </p:childTnLst>
+                                </p:cTn>
+                              </p:par>
+                              <p:par>
+                                <p:cTn fill="hold" nodeType="withEffect" presetClass="entr" presetID="1" presetSubtype="0">
+                                  <p:stCondLst>
+                                    <p:cond delay="0"/>
+                                  </p:stCondLst>
+                                  <p:childTnLst>
+                                    <p:set>
+                                      <p:cBhvr>
+                                        <p:cTn dur="1" fill="hold">
+                                          <p:stCondLst>
+                                            <p:cond delay="0"/>
+                                          </p:stCondLst>
+                                        </p:cTn>
+                                        <p:tgtEl>
+                                          <p:spTgt spid="217"/>
                                         </p:tgtEl>
                                         <p:attrNameLst>
                                           <p:attrName>style.visibility</p:attrName>
@@ -17736,7 +17856,7 @@
   <p:cSld>
     <p:spTree>
       <p:nvGrpSpPr>
-        <p:cNvPr id="221" name="Shape 221"/>
+        <p:cNvPr id="222" name="Shape 222"/>
         <p:cNvGrpSpPr/>
         <p:nvPr/>
       </p:nvGrpSpPr>
@@ -17750,7 +17870,7 @@
       </p:grpSpPr>
       <p:sp>
         <p:nvSpPr>
-          <p:cNvPr id="222" name="Google Shape;222;p36"/>
+          <p:cNvPr id="223" name="Google Shape;223;p36"/>
           <p:cNvSpPr txBox="1"/>
           <p:nvPr>
             <p:ph type="title"/>
@@ -17817,7 +17937,7 @@
       </p:sp>
       <p:sp>
         <p:nvSpPr>
-          <p:cNvPr id="223" name="Google Shape;223;p36"/>
+          <p:cNvPr id="224" name="Google Shape;224;p36"/>
           <p:cNvSpPr txBox="1"/>
           <p:nvPr>
             <p:ph idx="1" type="body"/>
@@ -17974,7 +18094,7 @@
       </p:sp>
       <p:sp>
         <p:nvSpPr>
-          <p:cNvPr id="224" name="Google Shape;224;p36"/>
+          <p:cNvPr id="225" name="Google Shape;225;p36"/>
           <p:cNvSpPr txBox="1"/>
           <p:nvPr>
             <p:ph idx="12" type="sldNum"/>
@@ -18022,7 +18142,7 @@
       </p:sp>
       <p:sp>
         <p:nvSpPr>
-          <p:cNvPr id="225" name="Google Shape;225;p36"/>
+          <p:cNvPr id="226" name="Google Shape;226;p36"/>
           <p:cNvSpPr/>
           <p:nvPr/>
         </p:nvSpPr>
@@ -18081,7 +18201,7 @@
       </p:sp>
       <p:pic>
         <p:nvPicPr>
-          <p:cNvPr id="226" name="Google Shape;226;p36"/>
+          <p:cNvPr id="227" name="Google Shape;227;p36"/>
           <p:cNvPicPr preferRelativeResize="0"/>
           <p:nvPr/>
         </p:nvPicPr>
@@ -18145,7 +18265,7 @@
                                           </p:stCondLst>
                                         </p:cTn>
                                         <p:tgtEl>
-                                          <p:spTgt spid="226"/>
+                                          <p:spTgt spid="227"/>
                                         </p:tgtEl>
                                         <p:attrNameLst>
                                           <p:attrName>style.visibility</p:attrName>
@@ -18194,7 +18314,7 @@
   <p:cSld>
     <p:spTree>
       <p:nvGrpSpPr>
-        <p:cNvPr id="230" name="Shape 230"/>
+        <p:cNvPr id="231" name="Shape 231"/>
         <p:cNvGrpSpPr/>
         <p:nvPr/>
       </p:nvGrpSpPr>
@@ -18208,7 +18328,7 @@
       </p:grpSpPr>
       <p:sp>
         <p:nvSpPr>
-          <p:cNvPr id="231" name="Google Shape;231;p37"/>
+          <p:cNvPr id="232" name="Google Shape;232;p37"/>
           <p:cNvSpPr txBox="1"/>
           <p:nvPr>
             <p:ph type="title"/>
@@ -18282,7 +18402,7 @@
       </p:sp>
       <p:pic>
         <p:nvPicPr>
-          <p:cNvPr id="232" name="Google Shape;232;p37"/>
+          <p:cNvPr id="233" name="Google Shape;233;p37"/>
           <p:cNvPicPr preferRelativeResize="0"/>
           <p:nvPr/>
         </p:nvPicPr>
@@ -18309,7 +18429,7 @@
       </p:pic>
       <p:sp>
         <p:nvSpPr>
-          <p:cNvPr id="233" name="Google Shape;233;p37"/>
+          <p:cNvPr id="234" name="Google Shape;234;p37"/>
           <p:cNvSpPr txBox="1"/>
           <p:nvPr>
             <p:ph idx="12" type="sldNum"/>
@@ -18368,7 +18488,7 @@
   <p:cSld>
     <p:spTree>
       <p:nvGrpSpPr>
-        <p:cNvPr id="237" name="Shape 237"/>
+        <p:cNvPr id="238" name="Shape 238"/>
         <p:cNvGrpSpPr/>
         <p:nvPr/>
       </p:nvGrpSpPr>
@@ -18382,7 +18502,7 @@
       </p:grpSpPr>
       <p:sp>
         <p:nvSpPr>
-          <p:cNvPr id="238" name="Google Shape;238;p38"/>
+          <p:cNvPr id="239" name="Google Shape;239;p38"/>
           <p:cNvSpPr txBox="1"/>
           <p:nvPr>
             <p:ph type="title"/>
@@ -18456,7 +18576,7 @@
       </p:sp>
       <p:pic>
         <p:nvPicPr>
-          <p:cNvPr id="239" name="Google Shape;239;p38"/>
+          <p:cNvPr id="240" name="Google Shape;240;p38"/>
           <p:cNvPicPr preferRelativeResize="0"/>
           <p:nvPr/>
         </p:nvPicPr>
@@ -18483,7 +18603,7 @@
       </p:pic>
       <p:sp>
         <p:nvSpPr>
-          <p:cNvPr id="240" name="Google Shape;240;p38"/>
+          <p:cNvPr id="241" name="Google Shape;241;p38"/>
           <p:cNvSpPr txBox="1"/>
           <p:nvPr>
             <p:ph idx="12" type="sldNum"/>
@@ -18542,7 +18662,7 @@
   <p:cSld>
     <p:spTree>
       <p:nvGrpSpPr>
-        <p:cNvPr id="244" name="Shape 244"/>
+        <p:cNvPr id="245" name="Shape 245"/>
         <p:cNvGrpSpPr/>
         <p:nvPr/>
       </p:nvGrpSpPr>
@@ -18556,7 +18676,7 @@
       </p:grpSpPr>
       <p:sp>
         <p:nvSpPr>
-          <p:cNvPr id="245" name="Google Shape;245;p39"/>
+          <p:cNvPr id="246" name="Google Shape;246;p39"/>
           <p:cNvSpPr txBox="1"/>
           <p:nvPr>
             <p:ph type="title"/>
@@ -18608,7 +18728,7 @@
       </p:sp>
       <p:grpSp>
         <p:nvGrpSpPr>
-          <p:cNvPr id="246" name="Google Shape;246;p39"/>
+          <p:cNvPr id="247" name="Google Shape;247;p39"/>
           <p:cNvGrpSpPr/>
           <p:nvPr/>
         </p:nvGrpSpPr>
@@ -18622,7 +18742,7 @@
         </p:grpSpPr>
         <p:sp>
           <p:nvSpPr>
-            <p:cNvPr id="247" name="Google Shape;247;p39"/>
+            <p:cNvPr id="248" name="Google Shape;248;p39"/>
             <p:cNvSpPr/>
             <p:nvPr/>
           </p:nvSpPr>
@@ -18673,7 +18793,7 @@
         </p:sp>
         <p:sp>
           <p:nvSpPr>
-            <p:cNvPr id="248" name="Google Shape;248;p39"/>
+            <p:cNvPr id="249" name="Google Shape;249;p39"/>
             <p:cNvSpPr txBox="1"/>
             <p:nvPr/>
           </p:nvSpPr>
@@ -18731,7 +18851,7 @@
         </p:sp>
         <p:sp>
           <p:nvSpPr>
-            <p:cNvPr id="249" name="Google Shape;249;p39"/>
+            <p:cNvPr id="250" name="Google Shape;250;p39"/>
             <p:cNvSpPr/>
             <p:nvPr/>
           </p:nvSpPr>
@@ -18782,7 +18902,7 @@
         </p:sp>
         <p:sp>
           <p:nvSpPr>
-            <p:cNvPr id="250" name="Google Shape;250;p39"/>
+            <p:cNvPr id="251" name="Google Shape;251;p39"/>
             <p:cNvSpPr txBox="1"/>
             <p:nvPr/>
           </p:nvSpPr>
@@ -18840,7 +18960,7 @@
         </p:sp>
         <p:sp>
           <p:nvSpPr>
-            <p:cNvPr id="251" name="Google Shape;251;p39"/>
+            <p:cNvPr id="252" name="Google Shape;252;p39"/>
             <p:cNvSpPr/>
             <p:nvPr/>
           </p:nvSpPr>
@@ -18891,7 +19011,7 @@
         </p:sp>
         <p:sp>
           <p:nvSpPr>
-            <p:cNvPr id="252" name="Google Shape;252;p39"/>
+            <p:cNvPr id="253" name="Google Shape;253;p39"/>
             <p:cNvSpPr txBox="1"/>
             <p:nvPr/>
           </p:nvSpPr>
@@ -18949,7 +19069,7 @@
         </p:sp>
         <p:sp>
           <p:nvSpPr>
-            <p:cNvPr id="253" name="Google Shape;253;p39"/>
+            <p:cNvPr id="254" name="Google Shape;254;p39"/>
             <p:cNvSpPr/>
             <p:nvPr/>
           </p:nvSpPr>
@@ -19000,7 +19120,7 @@
         </p:sp>
         <p:sp>
           <p:nvSpPr>
-            <p:cNvPr id="254" name="Google Shape;254;p39"/>
+            <p:cNvPr id="255" name="Google Shape;255;p39"/>
             <p:cNvSpPr txBox="1"/>
             <p:nvPr/>
           </p:nvSpPr>
@@ -19070,7 +19190,7 @@
   <p:cSld>
     <p:spTree>
       <p:nvGrpSpPr>
-        <p:cNvPr id="258" name="Shape 258"/>
+        <p:cNvPr id="259" name="Shape 259"/>
         <p:cNvGrpSpPr/>
         <p:nvPr/>
       </p:nvGrpSpPr>
@@ -19084,7 +19204,7 @@
       </p:grpSpPr>
       <p:sp>
         <p:nvSpPr>
-          <p:cNvPr id="259" name="Google Shape;259;p40"/>
+          <p:cNvPr id="260" name="Google Shape;260;p40"/>
           <p:cNvSpPr txBox="1"/>
           <p:nvPr>
             <p:ph type="title"/>
@@ -19136,7 +19256,7 @@
       </p:sp>
       <p:grpSp>
         <p:nvGrpSpPr>
-          <p:cNvPr id="260" name="Google Shape;260;p40"/>
+          <p:cNvPr id="261" name="Google Shape;261;p40"/>
           <p:cNvGrpSpPr/>
           <p:nvPr/>
         </p:nvGrpSpPr>
@@ -19150,7 +19270,7 @@
         </p:grpSpPr>
         <p:sp>
           <p:nvSpPr>
-            <p:cNvPr id="261" name="Google Shape;261;p40"/>
+            <p:cNvPr id="262" name="Google Shape;262;p40"/>
             <p:cNvSpPr/>
             <p:nvPr/>
           </p:nvSpPr>
@@ -19201,7 +19321,7 @@
         </p:sp>
         <p:sp>
           <p:nvSpPr>
-            <p:cNvPr id="262" name="Google Shape;262;p40"/>
+            <p:cNvPr id="263" name="Google Shape;263;p40"/>
             <p:cNvSpPr txBox="1"/>
             <p:nvPr/>
           </p:nvSpPr>
@@ -19259,7 +19379,7 @@
         </p:sp>
         <p:sp>
           <p:nvSpPr>
-            <p:cNvPr id="263" name="Google Shape;263;p40"/>
+            <p:cNvPr id="264" name="Google Shape;264;p40"/>
             <p:cNvSpPr/>
             <p:nvPr/>
           </p:nvSpPr>
@@ -19310,7 +19430,7 @@
         </p:sp>
         <p:sp>
           <p:nvSpPr>
-            <p:cNvPr id="264" name="Google Shape;264;p40"/>
+            <p:cNvPr id="265" name="Google Shape;265;p40"/>
             <p:cNvSpPr txBox="1"/>
             <p:nvPr/>
           </p:nvSpPr>
@@ -19368,7 +19488,7 @@
         </p:sp>
         <p:sp>
           <p:nvSpPr>
-            <p:cNvPr id="265" name="Google Shape;265;p40"/>
+            <p:cNvPr id="266" name="Google Shape;266;p40"/>
             <p:cNvSpPr/>
             <p:nvPr/>
           </p:nvSpPr>
@@ -19419,7 +19539,7 @@
         </p:sp>
         <p:sp>
           <p:nvSpPr>
-            <p:cNvPr id="266" name="Google Shape;266;p40"/>
+            <p:cNvPr id="267" name="Google Shape;267;p40"/>
             <p:cNvSpPr txBox="1"/>
             <p:nvPr/>
           </p:nvSpPr>
@@ -19477,7 +19597,7 @@
         </p:sp>
         <p:sp>
           <p:nvSpPr>
-            <p:cNvPr id="267" name="Google Shape;267;p40"/>
+            <p:cNvPr id="268" name="Google Shape;268;p40"/>
             <p:cNvSpPr/>
             <p:nvPr/>
           </p:nvSpPr>
@@ -19528,7 +19648,7 @@
         </p:sp>
         <p:sp>
           <p:nvSpPr>
-            <p:cNvPr id="268" name="Google Shape;268;p40"/>
+            <p:cNvPr id="269" name="Google Shape;269;p40"/>
             <p:cNvSpPr txBox="1"/>
             <p:nvPr/>
           </p:nvSpPr>
@@ -19598,7 +19718,7 @@
   <p:cSld>
     <p:spTree>
       <p:nvGrpSpPr>
-        <p:cNvPr id="272" name="Shape 272"/>
+        <p:cNvPr id="273" name="Shape 273"/>
         <p:cNvGrpSpPr/>
         <p:nvPr/>
       </p:nvGrpSpPr>
@@ -19612,7 +19732,7 @@
       </p:grpSpPr>
       <p:sp>
         <p:nvSpPr>
-          <p:cNvPr id="273" name="Google Shape;273;p41"/>
+          <p:cNvPr id="274" name="Google Shape;274;p41"/>
           <p:cNvSpPr txBox="1"/>
           <p:nvPr>
             <p:ph type="title"/>
@@ -19679,7 +19799,7 @@
       </p:sp>
       <p:sp>
         <p:nvSpPr>
-          <p:cNvPr id="274" name="Google Shape;274;p41"/>
+          <p:cNvPr id="275" name="Google Shape;275;p41"/>
           <p:cNvSpPr txBox="1"/>
           <p:nvPr>
             <p:ph idx="1" type="body"/>
@@ -19727,7 +19847,7 @@
       </p:sp>
       <p:pic>
         <p:nvPicPr>
-          <p:cNvPr id="275" name="Google Shape;275;p41"/>
+          <p:cNvPr id="276" name="Google Shape;276;p41"/>
           <p:cNvPicPr preferRelativeResize="0"/>
           <p:nvPr/>
         </p:nvPicPr>
@@ -19754,7 +19874,7 @@
       </p:pic>
       <p:sp>
         <p:nvSpPr>
-          <p:cNvPr id="276" name="Google Shape;276;p41"/>
+          <p:cNvPr id="277" name="Google Shape;277;p41"/>
           <p:cNvSpPr txBox="1"/>
           <p:nvPr>
             <p:ph idx="12" type="sldNum"/>
@@ -19813,7 +19933,7 @@
   <p:cSld>
     <p:spTree>
       <p:nvGrpSpPr>
-        <p:cNvPr id="280" name="Shape 280"/>
+        <p:cNvPr id="281" name="Shape 281"/>
         <p:cNvGrpSpPr/>
         <p:nvPr/>
       </p:nvGrpSpPr>
@@ -19827,7 +19947,7 @@
       </p:grpSpPr>
       <p:sp>
         <p:nvSpPr>
-          <p:cNvPr id="281" name="Google Shape;281;p42"/>
+          <p:cNvPr id="282" name="Google Shape;282;p42"/>
           <p:cNvSpPr txBox="1"/>
           <p:nvPr>
             <p:ph type="title"/>
@@ -19875,7 +19995,7 @@
       </p:sp>
       <p:sp>
         <p:nvSpPr>
-          <p:cNvPr id="282" name="Google Shape;282;p42"/>
+          <p:cNvPr id="283" name="Google Shape;283;p42"/>
           <p:cNvSpPr txBox="1"/>
           <p:nvPr/>
         </p:nvSpPr>
@@ -19939,7 +20059,7 @@
   <p:cSld>
     <p:spTree>
       <p:nvGrpSpPr>
-        <p:cNvPr id="286" name="Shape 286"/>
+        <p:cNvPr id="287" name="Shape 287"/>
         <p:cNvGrpSpPr/>
         <p:nvPr/>
       </p:nvGrpSpPr>
@@ -19953,7 +20073,7 @@
       </p:grpSpPr>
       <p:sp>
         <p:nvSpPr>
-          <p:cNvPr id="287" name="Google Shape;287;p43"/>
+          <p:cNvPr id="288" name="Google Shape;288;p43"/>
           <p:cNvSpPr txBox="1"/>
           <p:nvPr>
             <p:ph type="title"/>
@@ -20020,7 +20140,7 @@
       </p:sp>
       <p:sp>
         <p:nvSpPr>
-          <p:cNvPr id="288" name="Google Shape;288;p43"/>
+          <p:cNvPr id="289" name="Google Shape;289;p43"/>
           <p:cNvSpPr txBox="1"/>
           <p:nvPr>
             <p:ph idx="12" type="sldNum"/>
@@ -20068,7 +20188,7 @@
       </p:sp>
       <p:pic>
         <p:nvPicPr>
-          <p:cNvPr id="289" name="Google Shape;289;p43"/>
+          <p:cNvPr id="290" name="Google Shape;290;p43"/>
           <p:cNvPicPr preferRelativeResize="0"/>
           <p:nvPr/>
         </p:nvPicPr>
@@ -20490,7 +20610,7 @@
   <p:cSld>
     <p:spTree>
       <p:nvGrpSpPr>
-        <p:cNvPr id="293" name="Shape 293"/>
+        <p:cNvPr id="294" name="Shape 294"/>
         <p:cNvGrpSpPr/>
         <p:nvPr/>
       </p:nvGrpSpPr>
@@ -20504,7 +20624,7 @@
       </p:grpSpPr>
       <p:sp>
         <p:nvSpPr>
-          <p:cNvPr id="294" name="Google Shape;294;p44"/>
+          <p:cNvPr id="295" name="Google Shape;295;p44"/>
           <p:cNvSpPr txBox="1"/>
           <p:nvPr>
             <p:ph type="title"/>
@@ -20571,7 +20691,7 @@
       </p:sp>
       <p:sp>
         <p:nvSpPr>
-          <p:cNvPr id="295" name="Google Shape;295;p44"/>
+          <p:cNvPr id="296" name="Google Shape;296;p44"/>
           <p:cNvSpPr txBox="1"/>
           <p:nvPr>
             <p:ph idx="1" type="body"/>
@@ -20791,7 +20911,7 @@
       </p:sp>
       <p:sp>
         <p:nvSpPr>
-          <p:cNvPr id="296" name="Google Shape;296;p44"/>
+          <p:cNvPr id="297" name="Google Shape;297;p44"/>
           <p:cNvSpPr txBox="1"/>
           <p:nvPr>
             <p:ph idx="12" type="sldNum"/>
@@ -20850,7 +20970,7 @@
   <p:cSld>
     <p:spTree>
       <p:nvGrpSpPr>
-        <p:cNvPr id="300" name="Shape 300"/>
+        <p:cNvPr id="301" name="Shape 301"/>
         <p:cNvGrpSpPr/>
         <p:nvPr/>
       </p:nvGrpSpPr>
@@ -20864,7 +20984,7 @@
       </p:grpSpPr>
       <p:sp>
         <p:nvSpPr>
-          <p:cNvPr id="301" name="Google Shape;301;p45"/>
+          <p:cNvPr id="302" name="Google Shape;302;p45"/>
           <p:cNvSpPr txBox="1"/>
           <p:nvPr>
             <p:ph type="title"/>
@@ -20934,7 +21054,7 @@
       </p:sp>
       <p:sp>
         <p:nvSpPr>
-          <p:cNvPr id="302" name="Google Shape;302;p45"/>
+          <p:cNvPr id="303" name="Google Shape;303;p45"/>
           <p:cNvSpPr txBox="1"/>
           <p:nvPr>
             <p:ph idx="12" type="sldNum"/>
@@ -24612,6 +24732,285 @@
 </file>
 
 <file path=ppt/theme/theme2.xml><?xml version="1.0" encoding="utf-8"?>
+<a:theme xmlns:a="http://schemas.openxmlformats.org/drawingml/2006/main" xmlns:r="http://schemas.openxmlformats.org/officeDocument/2006/relationships" name="Simple Light">
+  <a:themeElements>
+    <a:clrScheme name="Simple Light">
+      <a:dk1>
+        <a:srgbClr val="000000"/>
+      </a:dk1>
+      <a:lt1>
+        <a:srgbClr val="FFFFFF"/>
+      </a:lt1>
+      <a:dk2>
+        <a:srgbClr val="595959"/>
+      </a:dk2>
+      <a:lt2>
+        <a:srgbClr val="EEEEEE"/>
+      </a:lt2>
+      <a:accent1>
+        <a:srgbClr val="4285F4"/>
+      </a:accent1>
+      <a:accent2>
+        <a:srgbClr val="212121"/>
+      </a:accent2>
+      <a:accent3>
+        <a:srgbClr val="78909C"/>
+      </a:accent3>
+      <a:accent4>
+        <a:srgbClr val="FFAB40"/>
+      </a:accent4>
+      <a:accent5>
+        <a:srgbClr val="0097A7"/>
+      </a:accent5>
+      <a:accent6>
+        <a:srgbClr val="EEFF41"/>
+      </a:accent6>
+      <a:hlink>
+        <a:srgbClr val="0097A7"/>
+      </a:hlink>
+      <a:folHlink>
+        <a:srgbClr val="0097A7"/>
+      </a:folHlink>
+    </a:clrScheme>
+    <a:fontScheme name="Office">
+      <a:majorFont>
+        <a:latin typeface="Arial"/>
+        <a:ea typeface=""/>
+        <a:cs typeface=""/>
+        <a:font script="Jpan" typeface="ＭＳ Ｐゴシック"/>
+        <a:font script="Hang" typeface="맑은 고딕"/>
+        <a:font script="Hans" typeface="宋体"/>
+        <a:font script="Hant" typeface="新細明體"/>
+        <a:font script="Arab" typeface="Times New Roman"/>
+        <a:font script="Hebr" typeface="Times New Roman"/>
+        <a:font script="Thai" typeface="Angsana New"/>
+        <a:font script="Ethi" typeface="Nyala"/>
+        <a:font script="Beng" typeface="Vrinda"/>
+        <a:font script="Gujr" typeface="Shruti"/>
+        <a:font script="Khmr" typeface="MoolBoran"/>
+        <a:font script="Knda" typeface="Tunga"/>
+        <a:font script="Guru" typeface="Raavi"/>
+        <a:font script="Cans" typeface="Euphemia"/>
+        <a:font script="Cher" typeface="Plantagenet Cherokee"/>
+        <a:font script="Yiii" typeface="Microsoft Yi Baiti"/>
+        <a:font script="Tibt" typeface="Microsoft Himalaya"/>
+        <a:font script="Thaa" typeface="MV Boli"/>
+        <a:font script="Deva" typeface="Mangal"/>
+        <a:font script="Telu" typeface="Gautami"/>
+        <a:font script="Taml" typeface="Latha"/>
+        <a:font script="Syrc" typeface="Estrangelo Edessa"/>
+        <a:font script="Orya" typeface="Kalinga"/>
+        <a:font script="Mlym" typeface="Kartika"/>
+        <a:font script="Laoo" typeface="DokChampa"/>
+        <a:font script="Sinh" typeface="Iskoola Pota"/>
+        <a:font script="Mong" typeface="Mongolian Baiti"/>
+        <a:font script="Viet" typeface="Times New Roman"/>
+        <a:font script="Uigh" typeface="Microsoft Uighur"/>
+        <a:font script="Geor" typeface="Sylfaen"/>
+      </a:majorFont>
+      <a:minorFont>
+        <a:latin typeface="Arial"/>
+        <a:ea typeface=""/>
+        <a:cs typeface=""/>
+        <a:font script="Jpan" typeface="ＭＳ Ｐゴシック"/>
+        <a:font script="Hang" typeface="맑은 고딕"/>
+        <a:font script="Hans" typeface="宋体"/>
+        <a:font script="Hant" typeface="新細明體"/>
+        <a:font script="Arab" typeface="Arial"/>
+        <a:font script="Hebr" typeface="Arial"/>
+        <a:font script="Thai" typeface="Cordia New"/>
+        <a:font script="Ethi" typeface="Nyala"/>
+        <a:font script="Beng" typeface="Vrinda"/>
+        <a:font script="Gujr" typeface="Shruti"/>
+        <a:font script="Khmr" typeface="DaunPenh"/>
+        <a:font script="Knda" typeface="Tunga"/>
+        <a:font script="Guru" typeface="Raavi"/>
+        <a:font script="Cans" typeface="Euphemia"/>
+        <a:font script="Cher" typeface="Plantagenet Cherokee"/>
+        <a:font script="Yiii" typeface="Microsoft Yi Baiti"/>
+        <a:font script="Tibt" typeface="Microsoft Himalaya"/>
+        <a:font script="Thaa" typeface="MV Boli"/>
+        <a:font script="Deva" typeface="Mangal"/>
+        <a:font script="Telu" typeface="Gautami"/>
+        <a:font script="Taml" typeface="Latha"/>
+        <a:font script="Syrc" typeface="Estrangelo Edessa"/>
+        <a:font script="Orya" typeface="Kalinga"/>
+        <a:font script="Mlym" typeface="Kartika"/>
+        <a:font script="Laoo" typeface="DokChampa"/>
+        <a:font script="Sinh" typeface="Iskoola Pota"/>
+        <a:font script="Mong" typeface="Mongolian Baiti"/>
+        <a:font script="Viet" typeface="Arial"/>
+        <a:font script="Uigh" typeface="Microsoft Uighur"/>
+        <a:font script="Geor" typeface="Sylfaen"/>
+      </a:minorFont>
+    </a:fontScheme>
+    <a:fmtScheme name="Office">
+      <a:fillStyleLst>
+        <a:solidFill>
+          <a:schemeClr val="phClr"/>
+        </a:solidFill>
+        <a:gradFill rotWithShape="1">
+          <a:gsLst>
+            <a:gs pos="0">
+              <a:schemeClr val="phClr">
+                <a:tint val="50000"/>
+                <a:satMod val="300000"/>
+              </a:schemeClr>
+            </a:gs>
+            <a:gs pos="35000">
+              <a:schemeClr val="phClr">
+                <a:tint val="37000"/>
+                <a:satMod val="300000"/>
+              </a:schemeClr>
+            </a:gs>
+            <a:gs pos="100000">
+              <a:schemeClr val="phClr">
+                <a:tint val="15000"/>
+                <a:satMod val="350000"/>
+              </a:schemeClr>
+            </a:gs>
+          </a:gsLst>
+          <a:lin ang="16200000" scaled="1"/>
+        </a:gradFill>
+        <a:gradFill rotWithShape="1">
+          <a:gsLst>
+            <a:gs pos="0">
+              <a:schemeClr val="phClr">
+                <a:tint val="100000"/>
+                <a:shade val="100000"/>
+                <a:satMod val="130000"/>
+              </a:schemeClr>
+            </a:gs>
+            <a:gs pos="100000">
+              <a:schemeClr val="phClr">
+                <a:tint val="50000"/>
+                <a:shade val="100000"/>
+                <a:satMod val="350000"/>
+              </a:schemeClr>
+            </a:gs>
+          </a:gsLst>
+          <a:lin ang="16200000" scaled="0"/>
+        </a:gradFill>
+      </a:fillStyleLst>
+      <a:lnStyleLst>
+        <a:ln w="9525" cap="flat" cmpd="sng" algn="ctr">
+          <a:solidFill>
+            <a:schemeClr val="phClr">
+              <a:shade val="95000"/>
+              <a:satMod val="105000"/>
+            </a:schemeClr>
+          </a:solidFill>
+          <a:prstDash val="solid"/>
+        </a:ln>
+        <a:ln w="25400" cap="flat" cmpd="sng" algn="ctr">
+          <a:solidFill>
+            <a:schemeClr val="phClr"/>
+          </a:solidFill>
+          <a:prstDash val="solid"/>
+        </a:ln>
+        <a:ln w="38100" cap="flat" cmpd="sng" algn="ctr">
+          <a:solidFill>
+            <a:schemeClr val="phClr"/>
+          </a:solidFill>
+          <a:prstDash val="solid"/>
+        </a:ln>
+      </a:lnStyleLst>
+      <a:effectStyleLst>
+        <a:effectStyle>
+          <a:effectLst>
+            <a:outerShdw blurRad="40000" dist="20000" dir="5400000" rotWithShape="0">
+              <a:srgbClr val="000000">
+                <a:alpha val="38000"/>
+              </a:srgbClr>
+            </a:outerShdw>
+          </a:effectLst>
+        </a:effectStyle>
+        <a:effectStyle>
+          <a:effectLst>
+            <a:outerShdw blurRad="40000" dist="23000" dir="5400000" rotWithShape="0">
+              <a:srgbClr val="000000">
+                <a:alpha val="35000"/>
+              </a:srgbClr>
+            </a:outerShdw>
+          </a:effectLst>
+        </a:effectStyle>
+        <a:effectStyle>
+          <a:effectLst>
+            <a:outerShdw blurRad="40000" dist="23000" dir="5400000" rotWithShape="0">
+              <a:srgbClr val="000000">
+                <a:alpha val="35000"/>
+              </a:srgbClr>
+            </a:outerShdw>
+          </a:effectLst>
+          <a:scene3d>
+            <a:camera prst="orthographicFront">
+              <a:rot lat="0" lon="0" rev="0"/>
+            </a:camera>
+            <a:lightRig rig="threePt" dir="t">
+              <a:rot lat="0" lon="0" rev="1200000"/>
+            </a:lightRig>
+          </a:scene3d>
+          <a:sp3d>
+            <a:bevelT w="63500" h="25400"/>
+          </a:sp3d>
+        </a:effectStyle>
+      </a:effectStyleLst>
+      <a:bgFillStyleLst>
+        <a:solidFill>
+          <a:schemeClr val="phClr"/>
+        </a:solidFill>
+        <a:gradFill rotWithShape="1">
+          <a:gsLst>
+            <a:gs pos="0">
+              <a:schemeClr val="phClr">
+                <a:tint val="40000"/>
+                <a:satMod val="350000"/>
+              </a:schemeClr>
+            </a:gs>
+            <a:gs pos="40000">
+              <a:schemeClr val="phClr">
+                <a:tint val="45000"/>
+                <a:shade val="99000"/>
+                <a:satMod val="350000"/>
+              </a:schemeClr>
+            </a:gs>
+            <a:gs pos="100000">
+              <a:schemeClr val="phClr">
+                <a:shade val="20000"/>
+                <a:satMod val="255000"/>
+              </a:schemeClr>
+            </a:gs>
+          </a:gsLst>
+          <a:path path="circle">
+            <a:fillToRect l="50000" t="-80000" r="50000" b="180000"/>
+          </a:path>
+        </a:gradFill>
+        <a:gradFill rotWithShape="1">
+          <a:gsLst>
+            <a:gs pos="0">
+              <a:schemeClr val="phClr">
+                <a:tint val="80000"/>
+                <a:satMod val="300000"/>
+              </a:schemeClr>
+            </a:gs>
+            <a:gs pos="100000">
+              <a:schemeClr val="phClr">
+                <a:shade val="30000"/>
+                <a:satMod val="200000"/>
+              </a:schemeClr>
+            </a:gs>
+          </a:gsLst>
+          <a:path path="circle">
+            <a:fillToRect l="50000" t="50000" r="50000" b="50000"/>
+          </a:path>
+        </a:gradFill>
+      </a:bgFillStyleLst>
+    </a:fmtScheme>
+  </a:themeElements>
+</a:theme>
+</file>
+
+<file path=ppt/theme/theme3.xml><?xml version="1.0" encoding="utf-8"?>
 <a:theme xmlns:a="http://schemas.openxmlformats.org/drawingml/2006/main" xmlns:r="http://schemas.openxmlformats.org/officeDocument/2006/relationships">
   <a:themeElements>
     <a:clrScheme name="Default">
@@ -24888,283 +25287,4 @@
     </a:fmtScheme>
   </a:themeElements>
 </a:theme>
-</file>
-
-<file path=ppt/theme/theme3.xml><?xml version="1.0" encoding="utf-8"?>
-<a:theme xmlns:a="http://schemas.openxmlformats.org/drawingml/2006/main" xmlns:r="http://schemas.openxmlformats.org/officeDocument/2006/relationships" name="Simple Light">
-  <a:themeElements>
-    <a:clrScheme name="Simple Light">
-      <a:dk1>
-        <a:srgbClr val="000000"/>
-      </a:dk1>
-      <a:lt1>
-        <a:srgbClr val="FFFFFF"/>
-      </a:lt1>
-      <a:dk2>
-        <a:srgbClr val="595959"/>
-      </a:dk2>
-      <a:lt2>
-        <a:srgbClr val="EEEEEE"/>
-      </a:lt2>
-      <a:accent1>
-        <a:srgbClr val="4285F4"/>
-      </a:accent1>
-      <a:accent2>
-        <a:srgbClr val="212121"/>
-      </a:accent2>
-      <a:accent3>
-        <a:srgbClr val="78909C"/>
-      </a:accent3>
-      <a:accent4>
-        <a:srgbClr val="FFAB40"/>
-      </a:accent4>
-      <a:accent5>
-        <a:srgbClr val="0097A7"/>
-      </a:accent5>
-      <a:accent6>
-        <a:srgbClr val="EEFF41"/>
-      </a:accent6>
-      <a:hlink>
-        <a:srgbClr val="0097A7"/>
-      </a:hlink>
-      <a:folHlink>
-        <a:srgbClr val="0097A7"/>
-      </a:folHlink>
-    </a:clrScheme>
-    <a:fontScheme name="Office">
-      <a:majorFont>
-        <a:latin typeface="Arial"/>
-        <a:ea typeface=""/>
-        <a:cs typeface=""/>
-        <a:font script="Jpan" typeface="ＭＳ Ｐゴシック"/>
-        <a:font script="Hang" typeface="맑은 고딕"/>
-        <a:font script="Hans" typeface="宋体"/>
-        <a:font script="Hant" typeface="新細明體"/>
-        <a:font script="Arab" typeface="Times New Roman"/>
-        <a:font script="Hebr" typeface="Times New Roman"/>
-        <a:font script="Thai" typeface="Angsana New"/>
-        <a:font script="Ethi" typeface="Nyala"/>
-        <a:font script="Beng" typeface="Vrinda"/>
-        <a:font script="Gujr" typeface="Shruti"/>
-        <a:font script="Khmr" typeface="MoolBoran"/>
-        <a:font script="Knda" typeface="Tunga"/>
-        <a:font script="Guru" typeface="Raavi"/>
-        <a:font script="Cans" typeface="Euphemia"/>
-        <a:font script="Cher" typeface="Plantagenet Cherokee"/>
-        <a:font script="Yiii" typeface="Microsoft Yi Baiti"/>
-        <a:font script="Tibt" typeface="Microsoft Himalaya"/>
-        <a:font script="Thaa" typeface="MV Boli"/>
-        <a:font script="Deva" typeface="Mangal"/>
-        <a:font script="Telu" typeface="Gautami"/>
-        <a:font script="Taml" typeface="Latha"/>
-        <a:font script="Syrc" typeface="Estrangelo Edessa"/>
-        <a:font script="Orya" typeface="Kalinga"/>
-        <a:font script="Mlym" typeface="Kartika"/>
-        <a:font script="Laoo" typeface="DokChampa"/>
-        <a:font script="Sinh" typeface="Iskoola Pota"/>
-        <a:font script="Mong" typeface="Mongolian Baiti"/>
-        <a:font script="Viet" typeface="Times New Roman"/>
-        <a:font script="Uigh" typeface="Microsoft Uighur"/>
-        <a:font script="Geor" typeface="Sylfaen"/>
-      </a:majorFont>
-      <a:minorFont>
-        <a:latin typeface="Arial"/>
-        <a:ea typeface=""/>
-        <a:cs typeface=""/>
-        <a:font script="Jpan" typeface="ＭＳ Ｐゴシック"/>
-        <a:font script="Hang" typeface="맑은 고딕"/>
-        <a:font script="Hans" typeface="宋体"/>
-        <a:font script="Hant" typeface="新細明體"/>
-        <a:font script="Arab" typeface="Arial"/>
-        <a:font script="Hebr" typeface="Arial"/>
-        <a:font script="Thai" typeface="Cordia New"/>
-        <a:font script="Ethi" typeface="Nyala"/>
-        <a:font script="Beng" typeface="Vrinda"/>
-        <a:font script="Gujr" typeface="Shruti"/>
-        <a:font script="Khmr" typeface="DaunPenh"/>
-        <a:font script="Knda" typeface="Tunga"/>
-        <a:font script="Guru" typeface="Raavi"/>
-        <a:font script="Cans" typeface="Euphemia"/>
-        <a:font script="Cher" typeface="Plantagenet Cherokee"/>
-        <a:font script="Yiii" typeface="Microsoft Yi Baiti"/>
-        <a:font script="Tibt" typeface="Microsoft Himalaya"/>
-        <a:font script="Thaa" typeface="MV Boli"/>
-        <a:font script="Deva" typeface="Mangal"/>
-        <a:font script="Telu" typeface="Gautami"/>
-        <a:font script="Taml" typeface="Latha"/>
-        <a:font script="Syrc" typeface="Estrangelo Edessa"/>
-        <a:font script="Orya" typeface="Kalinga"/>
-        <a:font script="Mlym" typeface="Kartika"/>
-        <a:font script="Laoo" typeface="DokChampa"/>
-        <a:font script="Sinh" typeface="Iskoola Pota"/>
-        <a:font script="Mong" typeface="Mongolian Baiti"/>
-        <a:font script="Viet" typeface="Arial"/>
-        <a:font script="Uigh" typeface="Microsoft Uighur"/>
-        <a:font script="Geor" typeface="Sylfaen"/>
-      </a:minorFont>
-    </a:fontScheme>
-    <a:fmtScheme name="Office">
-      <a:fillStyleLst>
-        <a:solidFill>
-          <a:schemeClr val="phClr"/>
-        </a:solidFill>
-        <a:gradFill rotWithShape="1">
-          <a:gsLst>
-            <a:gs pos="0">
-              <a:schemeClr val="phClr">
-                <a:tint val="50000"/>
-                <a:satMod val="300000"/>
-              </a:schemeClr>
-            </a:gs>
-            <a:gs pos="35000">
-              <a:schemeClr val="phClr">
-                <a:tint val="37000"/>
-                <a:satMod val="300000"/>
-              </a:schemeClr>
-            </a:gs>
-            <a:gs pos="100000">
-              <a:schemeClr val="phClr">
-                <a:tint val="15000"/>
-                <a:satMod val="350000"/>
-              </a:schemeClr>
-            </a:gs>
-          </a:gsLst>
-          <a:lin ang="16200000" scaled="1"/>
-        </a:gradFill>
-        <a:gradFill rotWithShape="1">
-          <a:gsLst>
-            <a:gs pos="0">
-              <a:schemeClr val="phClr">
-                <a:tint val="100000"/>
-                <a:shade val="100000"/>
-                <a:satMod val="130000"/>
-              </a:schemeClr>
-            </a:gs>
-            <a:gs pos="100000">
-              <a:schemeClr val="phClr">
-                <a:tint val="50000"/>
-                <a:shade val="100000"/>
-                <a:satMod val="350000"/>
-              </a:schemeClr>
-            </a:gs>
-          </a:gsLst>
-          <a:lin ang="16200000" scaled="0"/>
-        </a:gradFill>
-      </a:fillStyleLst>
-      <a:lnStyleLst>
-        <a:ln w="9525" cap="flat" cmpd="sng" algn="ctr">
-          <a:solidFill>
-            <a:schemeClr val="phClr">
-              <a:shade val="95000"/>
-              <a:satMod val="105000"/>
-            </a:schemeClr>
-          </a:solidFill>
-          <a:prstDash val="solid"/>
-        </a:ln>
-        <a:ln w="25400" cap="flat" cmpd="sng" algn="ctr">
-          <a:solidFill>
-            <a:schemeClr val="phClr"/>
-          </a:solidFill>
-          <a:prstDash val="solid"/>
-        </a:ln>
-        <a:ln w="38100" cap="flat" cmpd="sng" algn="ctr">
-          <a:solidFill>
-            <a:schemeClr val="phClr"/>
-          </a:solidFill>
-          <a:prstDash val="solid"/>
-        </a:ln>
-      </a:lnStyleLst>
-      <a:effectStyleLst>
-        <a:effectStyle>
-          <a:effectLst>
-            <a:outerShdw blurRad="40000" dist="20000" dir="5400000" rotWithShape="0">
-              <a:srgbClr val="000000">
-                <a:alpha val="38000"/>
-              </a:srgbClr>
-            </a:outerShdw>
-          </a:effectLst>
-        </a:effectStyle>
-        <a:effectStyle>
-          <a:effectLst>
-            <a:outerShdw blurRad="40000" dist="23000" dir="5400000" rotWithShape="0">
-              <a:srgbClr val="000000">
-                <a:alpha val="35000"/>
-              </a:srgbClr>
-            </a:outerShdw>
-          </a:effectLst>
-        </a:effectStyle>
-        <a:effectStyle>
-          <a:effectLst>
-            <a:outerShdw blurRad="40000" dist="23000" dir="5400000" rotWithShape="0">
-              <a:srgbClr val="000000">
-                <a:alpha val="35000"/>
-              </a:srgbClr>
-            </a:outerShdw>
-          </a:effectLst>
-          <a:scene3d>
-            <a:camera prst="orthographicFront">
-              <a:rot lat="0" lon="0" rev="0"/>
-            </a:camera>
-            <a:lightRig rig="threePt" dir="t">
-              <a:rot lat="0" lon="0" rev="1200000"/>
-            </a:lightRig>
-          </a:scene3d>
-          <a:sp3d>
-            <a:bevelT w="63500" h="25400"/>
-          </a:sp3d>
-        </a:effectStyle>
-      </a:effectStyleLst>
-      <a:bgFillStyleLst>
-        <a:solidFill>
-          <a:schemeClr val="phClr"/>
-        </a:solidFill>
-        <a:gradFill rotWithShape="1">
-          <a:gsLst>
-            <a:gs pos="0">
-              <a:schemeClr val="phClr">
-                <a:tint val="40000"/>
-                <a:satMod val="350000"/>
-              </a:schemeClr>
-            </a:gs>
-            <a:gs pos="40000">
-              <a:schemeClr val="phClr">
-                <a:tint val="45000"/>
-                <a:shade val="99000"/>
-                <a:satMod val="350000"/>
-              </a:schemeClr>
-            </a:gs>
-            <a:gs pos="100000">
-              <a:schemeClr val="phClr">
-                <a:shade val="20000"/>
-                <a:satMod val="255000"/>
-              </a:schemeClr>
-            </a:gs>
-          </a:gsLst>
-          <a:path path="circle">
-            <a:fillToRect l="50000" t="-80000" r="50000" b="180000"/>
-          </a:path>
-        </a:gradFill>
-        <a:gradFill rotWithShape="1">
-          <a:gsLst>
-            <a:gs pos="0">
-              <a:schemeClr val="phClr">
-                <a:tint val="80000"/>
-                <a:satMod val="300000"/>
-              </a:schemeClr>
-            </a:gs>
-            <a:gs pos="100000">
-              <a:schemeClr val="phClr">
-                <a:shade val="30000"/>
-                <a:satMod val="200000"/>
-              </a:schemeClr>
-            </a:gs>
-          </a:gsLst>
-          <a:path path="circle">
-            <a:fillToRect l="50000" t="50000" r="50000" b="50000"/>
-          </a:path>
-        </a:gradFill>
-      </a:bgFillStyleLst>
-    </a:fmtScheme>
-  </a:themeElements>
-</a:theme>
 </file>
</xml_diff>